<commit_message>
fix quality on logo, pseudocoded heuristic check
</commit_message>
<xml_diff>
--- a/CS205 Poster - Chen Sim 2013.pptx
+++ b/CS205 Poster - Chen Sim 2013.pptx
@@ -203,7 +203,7 @@
             <a:fld id="{E6CC2317-6751-4CD4-9995-8782DD78E936}" type="datetimeFigureOut">
               <a:rPr lang="en-US" smtClean="0"/>
               <a:pPr/>
-              <a:t>11/27/2013</a:t>
+              <a:t>11/28/2013</a:t>
             </a:fld>
             <a:endParaRPr lang="en-US" dirty="0"/>
           </a:p>
@@ -374,7 +374,7 @@
     </p:spTree>
     <p:extLst>
       <p:ext uri="{BB962C8B-B14F-4D97-AF65-F5344CB8AC3E}">
-        <p14:creationId xmlns:p14="http://schemas.microsoft.com/office/powerpoint/2010/main" xmlns="" val="3784840913"/>
+        <p14:creationId xmlns="" xmlns:p14="http://schemas.microsoft.com/office/powerpoint/2010/main" val="3784840913"/>
       </p:ext>
     </p:extLst>
   </p:cSld>
@@ -11640,13 +11640,7 @@
               <a:rPr lang="en-US" sz="3200" u="none" dirty="0" smtClean="0">
                 <a:latin typeface="Constantia" pitchFamily="18" charset="0"/>
               </a:rPr>
-              <a:t> </a:t>
-            </a:r>
-            <a:r>
-              <a:rPr lang="en-US" sz="3200" u="none" dirty="0" smtClean="0">
-                <a:latin typeface="Constantia" pitchFamily="18" charset="0"/>
-              </a:rPr>
-              <a:t>and Heuristic Computations</a:t>
+              <a:t> and Heuristic Computations</a:t>
             </a:r>
             <a:endParaRPr lang="en-US" sz="3200" u="none" dirty="0">
               <a:latin typeface="Constantia" pitchFamily="18" charset="0"/>
@@ -11673,13 +11667,7 @@
               <a:rPr lang="en-US" dirty="0" smtClean="0">
                 <a:latin typeface="Constantia" pitchFamily="18" charset="0"/>
               </a:rPr>
-              <a:t>Discussion/Algorith</a:t>
-            </a:r>
-            <a:r>
-              <a:rPr lang="en-US" dirty="0" smtClean="0">
-                <a:latin typeface="Constantia" pitchFamily="18" charset="0"/>
-              </a:rPr>
-              <a:t>m</a:t>
+              <a:t>Discussion/Algorithm</a:t>
             </a:r>
             <a:endParaRPr lang="en-US" dirty="0">
               <a:latin typeface="Constantia" pitchFamily="18" charset="0"/>
@@ -13167,30 +13155,6 @@
       </p:sp>
       <p:pic>
         <p:nvPicPr>
-          <p:cNvPr id="245" name="Picture Placeholder 244" descr="iacs_revised_rgb_cropwhite.jpeg"/>
-          <p:cNvPicPr>
-            <a:picLocks noGrp="1" noChangeAspect="1"/>
-          </p:cNvPicPr>
-          <p:nvPr>
-            <p:ph type="pic" sz="quarter" idx="15"/>
-          </p:nvPr>
-        </p:nvPicPr>
-        <p:blipFill>
-          <a:blip r:embed="rId2" cstate="print"/>
-          <a:srcRect l="36" r="36"/>
-          <a:stretch>
-            <a:fillRect/>
-          </a:stretch>
-        </p:blipFill>
-        <p:spPr>
-          <a:xfrm>
-            <a:off x="0" y="739775"/>
-            <a:ext cx="8001000" cy="1676400"/>
-          </a:xfrm>
-        </p:spPr>
-      </p:pic>
-      <p:pic>
-        <p:nvPicPr>
           <p:cNvPr id="246" name="Picture 245" descr="SEASLogo.png"/>
           <p:cNvPicPr>
             <a:picLocks noChangeAspect="1"/>
@@ -13198,10 +13162,10 @@
           <p:nvPr/>
         </p:nvPicPr>
         <p:blipFill>
-          <a:blip r:embed="rId3" cstate="print">
+          <a:blip r:embed="rId2" cstate="print">
             <a:extLst>
               <a:ext uri="{28A0092B-C50C-407E-A947-70E740481C1C}">
-                <a14:useLocalDpi xmlns:a14="http://schemas.microsoft.com/office/drawing/2010/main" xmlns="" val="0"/>
+                <a14:useLocalDpi xmlns="" xmlns:a14="http://schemas.microsoft.com/office/drawing/2010/main" val="0"/>
               </a:ext>
             </a:extLst>
           </a:blip>
@@ -13211,7 +13175,7 @@
         </p:blipFill>
         <p:spPr>
           <a:xfrm>
-            <a:off x="25498204" y="442595"/>
+            <a:off x="25686462" y="442595"/>
             <a:ext cx="6358639" cy="2485618"/>
           </a:xfrm>
           <a:prstGeom prst="rect">
@@ -13220,12 +13184,36 @@
           <a:solidFill>
             <a:schemeClr val="bg1"/>
           </a:solidFill>
+        </p:spPr>
+      </p:pic>
+      <p:pic>
+        <p:nvPicPr>
+          <p:cNvPr id="64" name="Picture Placeholder 63" descr="IACS Logo.jpeg"/>
+          <p:cNvPicPr>
+            <a:picLocks noGrp="1" noChangeAspect="1"/>
+          </p:cNvPicPr>
+          <p:nvPr>
+            <p:ph type="pic" sz="quarter" idx="15"/>
+          </p:nvPr>
+        </p:nvPicPr>
+        <p:blipFill>
+          <a:blip r:embed="rId3" cstate="print"/>
+          <a:srcRect t="745" b="745"/>
+          <a:stretch>
+            <a:fillRect/>
+          </a:stretch>
+        </p:blipFill>
+        <p:spPr>
+          <a:xfrm>
+            <a:off x="107577" y="788894"/>
+            <a:ext cx="7745505" cy="1676400"/>
+          </a:xfrm>
         </p:spPr>
       </p:pic>
     </p:spTree>
     <p:extLst>
       <p:ext uri="{BB962C8B-B14F-4D97-AF65-F5344CB8AC3E}">
-        <p14:creationId xmlns:p14="http://schemas.microsoft.com/office/powerpoint/2010/main" xmlns="" val="2212419635"/>
+        <p14:creationId xmlns="" xmlns:p14="http://schemas.microsoft.com/office/powerpoint/2010/main" val="2212419635"/>
       </p:ext>
     </p:extLst>
   </p:cSld>

</xml_diff>

<commit_message>
tested diagonal, another poster update
</commit_message>
<xml_diff>
--- a/CS205 Poster - Chen Sim 2013.pptx
+++ b/CS205 Poster - Chen Sim 2013.pptx
@@ -374,7 +374,7 @@
     </p:spTree>
     <p:extLst>
       <p:ext uri="{BB962C8B-B14F-4D97-AF65-F5344CB8AC3E}">
-        <p14:creationId xmlns:p14="http://schemas.microsoft.com/office/powerpoint/2010/main" xmlns="" val="3784840913"/>
+        <p14:creationId xmlns="" xmlns:p14="http://schemas.microsoft.com/office/powerpoint/2010/main" val="3784840913"/>
       </p:ext>
     </p:extLst>
   </p:cSld>
@@ -11459,19 +11459,7 @@
               <a:rPr lang="en-US" dirty="0" smtClean="0">
                 <a:latin typeface="Constantia" pitchFamily="18" charset="0"/>
               </a:rPr>
-              <a:t>) is a </a:t>
-            </a:r>
-            <a:r>
-              <a:rPr lang="en-US" dirty="0" smtClean="0">
-                <a:latin typeface="Constantia" pitchFamily="18" charset="0"/>
-              </a:rPr>
-              <a:t>2-player, zero-sum board game normally played on a 15x15 grid.  The players alternate turns, placing a piece anywher</a:t>
-            </a:r>
-            <a:r>
-              <a:rPr lang="en-US" dirty="0" smtClean="0">
-                <a:latin typeface="Constantia" pitchFamily="18" charset="0"/>
-              </a:rPr>
-              <a:t>e on the grid.  The first to have at least 5 pieces in a row (horizontally, vertically or diagonally) wins.</a:t>
+              <a:t>) is a 2-player, zero-sum board game normally played on a 15x15 grid.  The players alternate turns, placing a piece anywhere on the grid.  The first to have at least 5 pieces in a row (horizontally, vertically or diagonally) wins.</a:t>
             </a:r>
           </a:p>
           <a:p>
@@ -11676,16 +11664,7 @@
                 </a:solidFill>
                 <a:latin typeface="Constantia" pitchFamily="18" charset="0"/>
               </a:rPr>
-              <a:t>Diagram to show the game state </a:t>
-            </a:r>
-            <a:r>
-              <a:rPr lang="en-US" dirty="0" smtClean="0">
-                <a:solidFill>
-                  <a:srgbClr val="FF0000"/>
-                </a:solidFill>
-                <a:latin typeface="Constantia" pitchFamily="18" charset="0"/>
-              </a:rPr>
-              <a:t>tree</a:t>
+              <a:t>Diagram to show the game state tree</a:t>
             </a:r>
           </a:p>
           <a:p>
@@ -11875,209 +11854,176 @@
               <a:rPr lang="en-US" dirty="0" smtClean="0">
                 <a:latin typeface="Constantia" pitchFamily="18" charset="0"/>
               </a:rPr>
-              <a:t> game tree is an embarrassingly parallel problem.  For each ply, one more depth of all possible moves must be evaluated.  If we do not consider any optimization, which we will not in this section, our full game tree can be evenly divided if we break off the work at the first layer.  Thus, each processor will handle a subset of depth (max-1) trees, or in other words, each processor will examine  all the future moves based on fixing a subset of the immediate next move.  We plan to use MPI communication.  </a:t>
+              <a:t> game tree is an embarrassingly parallel problem.  For each ply, one more depth of all possible moves must be evaluated.  If we do not consider any optimization, which we will not in this section, our full game tree can be evenly divided if we break off the work at the first layer.  Thus, each processor will handle a subset of depth (max-1) trees, or in other words, each processor will examine  all the future moves based on fixing a subset of the immediate next move.  We plan to use MPI communication.  Master-slave  approaches may be implemented  but with a pure </a:t>
+            </a:r>
+            <a:r>
+              <a:rPr lang="en-US" dirty="0" err="1" smtClean="0">
+                <a:latin typeface="Constantia" pitchFamily="18" charset="0"/>
+              </a:rPr>
+              <a:t>minimax</a:t>
             </a:r>
             <a:r>
               <a:rPr lang="en-US" dirty="0" smtClean="0">
                 <a:latin typeface="Constantia" pitchFamily="18" charset="0"/>
               </a:rPr>
-              <a:t>Master-slave  approaches may be implemented  but with a pure </a:t>
-            </a:r>
-            <a:r>
-              <a:rPr lang="en-US" dirty="0" err="1" smtClean="0">
+              <a:t> tree, the load will always be balanced and therefore scatter/gather methods may be simpler to implement</a:t>
+            </a:r>
+          </a:p>
+          <a:p>
+            <a:endParaRPr lang="en-US" dirty="0" smtClean="0">
+              <a:latin typeface="Constantia" pitchFamily="18" charset="0"/>
+            </a:endParaRPr>
+          </a:p>
+          <a:p>
+            <a:r>
+              <a:rPr lang="en-US" dirty="0" smtClean="0">
+                <a:solidFill>
+                  <a:srgbClr val="FF0000"/>
+                </a:solidFill>
                 <a:latin typeface="Constantia" pitchFamily="18" charset="0"/>
               </a:rPr>
-              <a:t>minimax</a:t>
-            </a:r>
+              <a:t>Get graphic similar to the one before just with the different primary branches colored differently or boxed for each processor</a:t>
+            </a:r>
+          </a:p>
+          <a:p>
+            <a:endParaRPr lang="en-US" dirty="0" smtClean="0">
+              <a:latin typeface="Constantia" pitchFamily="18" charset="0"/>
+            </a:endParaRPr>
+          </a:p>
+          <a:p>
+            <a:endParaRPr lang="en-US" dirty="0" smtClean="0">
+              <a:latin typeface="Constantia" pitchFamily="18" charset="0"/>
+            </a:endParaRPr>
+          </a:p>
+          <a:p>
+            <a:endParaRPr lang="en-US" dirty="0" smtClean="0">
+              <a:latin typeface="Constantia" pitchFamily="18" charset="0"/>
+            </a:endParaRPr>
+          </a:p>
+          <a:p>
+            <a:endParaRPr lang="en-US" dirty="0" smtClean="0">
+              <a:latin typeface="Constantia" pitchFamily="18" charset="0"/>
+            </a:endParaRPr>
+          </a:p>
+          <a:p>
+            <a:endParaRPr lang="en-US" dirty="0" smtClean="0">
+              <a:latin typeface="Constantia" pitchFamily="18" charset="0"/>
+            </a:endParaRPr>
+          </a:p>
+          <a:p>
+            <a:endParaRPr lang="en-US" dirty="0" smtClean="0">
+              <a:latin typeface="Constantia" pitchFamily="18" charset="0"/>
+            </a:endParaRPr>
+          </a:p>
+          <a:p>
+            <a:endParaRPr lang="en-US" dirty="0" smtClean="0">
+              <a:latin typeface="Constantia" pitchFamily="18" charset="0"/>
+            </a:endParaRPr>
+          </a:p>
+          <a:p>
+            <a:endParaRPr lang="en-US" dirty="0" smtClean="0">
+              <a:latin typeface="Constantia" pitchFamily="18" charset="0"/>
+            </a:endParaRPr>
+          </a:p>
+          <a:p>
+            <a:endParaRPr lang="en-US" dirty="0" smtClean="0">
+              <a:latin typeface="Constantia" pitchFamily="18" charset="0"/>
+            </a:endParaRPr>
+          </a:p>
+          <a:p>
+            <a:endParaRPr lang="en-US" dirty="0" smtClean="0">
+              <a:latin typeface="Constantia" pitchFamily="18" charset="0"/>
+            </a:endParaRPr>
+          </a:p>
+          <a:p>
+            <a:endParaRPr lang="en-US" dirty="0" smtClean="0">
+              <a:latin typeface="Constantia" pitchFamily="18" charset="0"/>
+            </a:endParaRPr>
+          </a:p>
+          <a:p>
             <a:r>
               <a:rPr lang="en-US" dirty="0" smtClean="0">
                 <a:latin typeface="Constantia" pitchFamily="18" charset="0"/>
               </a:rPr>
-              <a:t> tree, the load will always be balanced and therefore scatter/gather methods may be simpler </a:t>
-            </a:r>
-            <a:r>
-              <a:rPr lang="en-US" smtClean="0">
-                <a:latin typeface="Constantia" pitchFamily="18" charset="0"/>
-              </a:rPr>
-              <a:t>to implement</a:t>
-            </a:r>
+              <a:t>In principle, the heuristic computation could also be done by GPU but because of the nature of the various heuristics – only needing to check the immediate squares affected by the last move played, the actual heuristic computation is not as time consuming as simply computing over the space of possible game states.</a:t>
+            </a:r>
+          </a:p>
+          <a:p>
             <a:endParaRPr lang="en-US" dirty="0" smtClean="0">
               <a:latin typeface="Constantia" pitchFamily="18" charset="0"/>
             </a:endParaRPr>
           </a:p>
-          <a:p>
-            <a:endParaRPr lang="en-US" dirty="0" smtClean="0">
+        </p:txBody>
+      </p:sp>
+      <p:sp>
+        <p:nvSpPr>
+          <p:cNvPr id="187" name="Text Placeholder 186"/>
+          <p:cNvSpPr>
+            <a:spLocks noGrp="1"/>
+          </p:cNvSpPr>
+          <p:nvPr>
+            <p:ph type="body" sz="quarter" idx="22"/>
+          </p:nvPr>
+        </p:nvSpPr>
+        <p:spPr>
+          <a:xfrm>
+            <a:off x="8687068" y="3464327"/>
+            <a:ext cx="15540038" cy="624326"/>
+          </a:xfrm>
+        </p:spPr>
+        <p:txBody>
+          <a:bodyPr/>
+          <a:lstStyle/>
+          <a:p>
+            <a:r>
+              <a:rPr lang="en-US" sz="3200" u="none" dirty="0" smtClean="0">
+                <a:latin typeface="Constantia" pitchFamily="18" charset="0"/>
+              </a:rPr>
+              <a:t>Parallelizing </a:t>
+            </a:r>
+            <a:r>
+              <a:rPr lang="en-US" sz="3200" u="none" dirty="0" err="1" smtClean="0">
+                <a:latin typeface="Constantia" pitchFamily="18" charset="0"/>
+              </a:rPr>
+              <a:t>Minimax</a:t>
+            </a:r>
+            <a:r>
+              <a:rPr lang="en-US" sz="3200" u="none" dirty="0" smtClean="0">
+                <a:latin typeface="Constantia" pitchFamily="18" charset="0"/>
+              </a:rPr>
+              <a:t> and Heuristic Computations</a:t>
+            </a:r>
+            <a:endParaRPr lang="en-US" sz="3200" u="none" dirty="0">
               <a:latin typeface="Constantia" pitchFamily="18" charset="0"/>
             </a:endParaRPr>
           </a:p>
-          <a:p>
-            <a:r>
-              <a:rPr lang="en-US" dirty="0" smtClean="0">
-                <a:solidFill>
-                  <a:srgbClr val="FF0000"/>
-                </a:solidFill>
-                <a:latin typeface="Constantia" pitchFamily="18" charset="0"/>
-              </a:rPr>
-              <a:t>Get graphic similar to the one before just with the different primary branches colored differently or boxed for each processor</a:t>
-            </a:r>
-          </a:p>
-          <a:p>
-            <a:endParaRPr lang="en-US" dirty="0" smtClean="0">
-              <a:latin typeface="Constantia" pitchFamily="18" charset="0"/>
-            </a:endParaRPr>
-          </a:p>
-          <a:p>
-            <a:endParaRPr lang="en-US" dirty="0" smtClean="0">
-              <a:latin typeface="Constantia" pitchFamily="18" charset="0"/>
-            </a:endParaRPr>
-          </a:p>
-          <a:p>
-            <a:endParaRPr lang="en-US" dirty="0" smtClean="0">
-              <a:latin typeface="Constantia" pitchFamily="18" charset="0"/>
-            </a:endParaRPr>
-          </a:p>
-          <a:p>
-            <a:endParaRPr lang="en-US" dirty="0" smtClean="0">
-              <a:latin typeface="Constantia" pitchFamily="18" charset="0"/>
-            </a:endParaRPr>
-          </a:p>
-          <a:p>
-            <a:endParaRPr lang="en-US" dirty="0" smtClean="0">
-              <a:latin typeface="Constantia" pitchFamily="18" charset="0"/>
-            </a:endParaRPr>
-          </a:p>
-          <a:p>
-            <a:endParaRPr lang="en-US" dirty="0" smtClean="0">
-              <a:latin typeface="Constantia" pitchFamily="18" charset="0"/>
-            </a:endParaRPr>
-          </a:p>
-          <a:p>
-            <a:endParaRPr lang="en-US" dirty="0" smtClean="0">
-              <a:latin typeface="Constantia" pitchFamily="18" charset="0"/>
-            </a:endParaRPr>
-          </a:p>
-          <a:p>
-            <a:endParaRPr lang="en-US" dirty="0" smtClean="0">
-              <a:latin typeface="Constantia" pitchFamily="18" charset="0"/>
-            </a:endParaRPr>
-          </a:p>
-          <a:p>
-            <a:endParaRPr lang="en-US" dirty="0" smtClean="0">
-              <a:latin typeface="Constantia" pitchFamily="18" charset="0"/>
-            </a:endParaRPr>
-          </a:p>
-          <a:p>
-            <a:endParaRPr lang="en-US" dirty="0" smtClean="0">
-              <a:latin typeface="Constantia" pitchFamily="18" charset="0"/>
-            </a:endParaRPr>
-          </a:p>
-          <a:p>
-            <a:endParaRPr lang="en-US" dirty="0" smtClean="0">
-              <a:latin typeface="Constantia" pitchFamily="18" charset="0"/>
-            </a:endParaRPr>
-          </a:p>
+        </p:txBody>
+      </p:sp>
+      <p:sp>
+        <p:nvSpPr>
+          <p:cNvPr id="188" name="Text Placeholder 187"/>
+          <p:cNvSpPr>
+            <a:spLocks noGrp="1"/>
+          </p:cNvSpPr>
+          <p:nvPr>
+            <p:ph type="body" sz="quarter" idx="23"/>
+          </p:nvPr>
+        </p:nvSpPr>
+        <p:spPr>
+          <a:xfrm>
+            <a:off x="8687068" y="17648029"/>
+            <a:ext cx="15540038" cy="3210493"/>
+          </a:xfrm>
+        </p:spPr>
+        <p:txBody>
+          <a:bodyPr/>
+          <a:lstStyle/>
           <a:p>
             <a:r>
               <a:rPr lang="en-US" dirty="0" smtClean="0">
                 <a:latin typeface="Constantia" pitchFamily="18" charset="0"/>
               </a:rPr>
-              <a:t>In principle, the heuristic computation could also be done by GPU but because of the nature of the various heuristics – only needing to check the immediate squares affected by the last move played, the actual heuristic computation is not as time consuming as simply computing over the space of possible game states.</a:t>
-            </a:r>
-          </a:p>
-          <a:p>
-            <a:endParaRPr lang="en-US" dirty="0" smtClean="0">
-              <a:latin typeface="Constantia" pitchFamily="18" charset="0"/>
-            </a:endParaRPr>
-          </a:p>
-        </p:txBody>
-      </p:sp>
-      <p:sp>
-        <p:nvSpPr>
-          <p:cNvPr id="187" name="Text Placeholder 186"/>
-          <p:cNvSpPr>
-            <a:spLocks noGrp="1"/>
-          </p:cNvSpPr>
-          <p:nvPr>
-            <p:ph type="body" sz="quarter" idx="22"/>
-          </p:nvPr>
-        </p:nvSpPr>
-        <p:spPr>
-          <a:xfrm>
-            <a:off x="8687068" y="3464327"/>
-            <a:ext cx="15540038" cy="624326"/>
-          </a:xfrm>
-        </p:spPr>
-        <p:txBody>
-          <a:bodyPr/>
-          <a:lstStyle/>
-          <a:p>
-            <a:r>
-              <a:rPr lang="en-US" sz="3200" u="none" dirty="0" smtClean="0">
-                <a:latin typeface="Constantia" pitchFamily="18" charset="0"/>
-              </a:rPr>
-              <a:t>Parallelizing </a:t>
-            </a:r>
-            <a:r>
-              <a:rPr lang="en-US" sz="3200" u="none" dirty="0" err="1" smtClean="0">
-                <a:latin typeface="Constantia" pitchFamily="18" charset="0"/>
-              </a:rPr>
-              <a:t>Minimax</a:t>
-            </a:r>
-            <a:r>
-              <a:rPr lang="en-US" sz="3200" u="none" dirty="0" smtClean="0">
-                <a:latin typeface="Constantia" pitchFamily="18" charset="0"/>
-              </a:rPr>
-              <a:t> and Heuristic Computations</a:t>
-            </a:r>
-            <a:endParaRPr lang="en-US" sz="3200" u="none" dirty="0">
-              <a:latin typeface="Constantia" pitchFamily="18" charset="0"/>
-            </a:endParaRPr>
-          </a:p>
-        </p:txBody>
-      </p:sp>
-      <p:sp>
-        <p:nvSpPr>
-          <p:cNvPr id="188" name="Text Placeholder 187"/>
-          <p:cNvSpPr>
-            <a:spLocks noGrp="1"/>
-          </p:cNvSpPr>
-          <p:nvPr>
-            <p:ph type="body" sz="quarter" idx="23"/>
-          </p:nvPr>
-        </p:nvSpPr>
-        <p:spPr>
-          <a:xfrm>
-            <a:off x="8687068" y="17648029"/>
-            <a:ext cx="15540038" cy="3210493"/>
-          </a:xfrm>
-        </p:spPr>
-        <p:txBody>
-          <a:bodyPr/>
-          <a:lstStyle/>
-          <a:p>
-            <a:r>
-              <a:rPr lang="en-US" dirty="0" smtClean="0">
-                <a:latin typeface="Constantia" pitchFamily="18" charset="0"/>
-              </a:rPr>
-              <a:t>Parallelizing search space reduction is an area that we will experiment with.  </a:t>
-            </a:r>
-            <a:r>
-              <a:rPr lang="en-US" dirty="0" smtClean="0">
-                <a:latin typeface="Constantia" pitchFamily="18" charset="0"/>
-              </a:rPr>
-              <a:t>The easiest technique would be  to run this optimization portion serially, - meaning each processor will use the optimization algorithm from its own first node and below.  This should give a speedup over the non-pruned version.  However, this setup will not allow for the information on one branch to prune the other branches.</a:t>
-            </a:r>
-            <a:r>
-              <a:rPr lang="en-US" dirty="0" smtClean="0">
-                <a:latin typeface="Constantia" pitchFamily="18" charset="0"/>
-              </a:rPr>
-              <a:t> </a:t>
-            </a:r>
-            <a:r>
-              <a:rPr lang="en-US" dirty="0" smtClean="0">
-                <a:latin typeface="Constantia" pitchFamily="18" charset="0"/>
-              </a:rPr>
-              <a:t> As discussed above, full </a:t>
+              <a:t>Parallelizing search space reduction is an area that we will experiment with.  The easiest technique would be  to run this optimization portion serially, - meaning each processor will use the optimization algorithm from its own first node and below.  This should give a speedup over the non-pruned version.  However, this setup will not allow for the information on one branch to prune the other branches.  As discussed above, full </a:t>
             </a:r>
             <a:r>
               <a:rPr lang="el-GR" dirty="0" smtClean="0">
@@ -12105,21 +12051,44 @@
                 <a:latin typeface="Cambria Math"/>
                 <a:ea typeface="Cambria Math"/>
               </a:rPr>
-              <a:t> is naturally a serial algorithm as the more that is searched serially allows for more pruning to follow. </a:t>
+              <a:t> is naturally a serial algorithm as the more that is searched serially allows for more pruning to follow.  Below are a couple of methods we have considered to parallelize </a:t>
+            </a:r>
+            <a:r>
+              <a:rPr lang="el-GR" dirty="0" smtClean="0">
+                <a:latin typeface="Cambria Math"/>
+                <a:ea typeface="Cambria Math"/>
+              </a:rPr>
+              <a:t>α</a:t>
             </a:r>
             <a:r>
               <a:rPr lang="en-US" dirty="0" smtClean="0">
                 <a:latin typeface="Cambria Math"/>
                 <a:ea typeface="Cambria Math"/>
               </a:rPr>
-              <a:t> </a:t>
+              <a:t>-</a:t>
+            </a:r>
+            <a:r>
+              <a:rPr lang="el-GR" dirty="0" smtClean="0">
+                <a:latin typeface="Cambria Math"/>
+                <a:ea typeface="Cambria Math"/>
+              </a:rPr>
+              <a:t>β</a:t>
             </a:r>
             <a:r>
               <a:rPr lang="en-US" dirty="0" smtClean="0">
                 <a:latin typeface="Cambria Math"/>
                 <a:ea typeface="Cambria Math"/>
               </a:rPr>
-              <a:t>Below are a couple of methods we have considered to parallelize </a:t>
+              <a:t> pruning if necessary:</a:t>
+            </a:r>
+          </a:p>
+          <a:p>
+            <a:r>
+              <a:rPr lang="en-US" dirty="0" smtClean="0">
+                <a:latin typeface="Cambria Math"/>
+                <a:ea typeface="Cambria Math"/>
+              </a:rPr>
+              <a:t>1) One processor  will be dedicated to sampling evenly from all the processor’s branches a set of states from which it will constantly update and broadcast the </a:t>
             </a:r>
             <a:r>
               <a:rPr lang="el-GR" dirty="0" smtClean="0">
@@ -12147,150 +12116,113 @@
                 <a:latin typeface="Cambria Math"/>
                 <a:ea typeface="Cambria Math"/>
               </a:rPr>
-              <a:t> pruning if necessary:</a:t>
-            </a:r>
-          </a:p>
-          <a:p>
+              <a:t> values that will be used for pruning – this will not always result in the mot optimal </a:t>
+            </a:r>
+            <a:r>
+              <a:rPr lang="el-GR" dirty="0" smtClean="0">
+                <a:latin typeface="Cambria Math"/>
+                <a:ea typeface="Cambria Math"/>
+              </a:rPr>
+              <a:t>α</a:t>
+            </a:r>
             <a:r>
               <a:rPr lang="en-US" dirty="0" smtClean="0">
                 <a:latin typeface="Cambria Math"/>
                 <a:ea typeface="Cambria Math"/>
               </a:rPr>
-              <a:t>1) One processor  will be dedicated to sampling evenly from all the processor’s branches a set of states from which it will constantly update and broadcast the </a:t>
+              <a:t>-</a:t>
             </a:r>
             <a:r>
               <a:rPr lang="el-GR" dirty="0" smtClean="0">
                 <a:latin typeface="Cambria Math"/>
                 <a:ea typeface="Cambria Math"/>
               </a:rPr>
-              <a:t>α</a:t>
+              <a:t>β</a:t>
             </a:r>
             <a:r>
               <a:rPr lang="en-US" dirty="0" smtClean="0">
                 <a:latin typeface="Cambria Math"/>
                 <a:ea typeface="Cambria Math"/>
               </a:rPr>
-              <a:t>-</a:t>
+              <a:t> to prune with but will allow the most parallel work to be done</a:t>
+            </a:r>
+          </a:p>
+          <a:p>
+            <a:r>
+              <a:rPr lang="en-US" dirty="0" smtClean="0">
+                <a:latin typeface="Cambria Math"/>
+                <a:ea typeface="Cambria Math"/>
+              </a:rPr>
+              <a:t>2) Each processor will </a:t>
+            </a:r>
+            <a:r>
+              <a:rPr lang="en-US" dirty="0" err="1" smtClean="0">
+                <a:latin typeface="Cambria Math"/>
+                <a:ea typeface="Cambria Math"/>
+              </a:rPr>
+              <a:t>asynchonously</a:t>
+            </a:r>
+            <a:r>
+              <a:rPr lang="en-US" dirty="0" smtClean="0">
+                <a:latin typeface="Cambria Math"/>
+                <a:ea typeface="Cambria Math"/>
+              </a:rPr>
+              <a:t> send and receive current best </a:t>
             </a:r>
             <a:r>
               <a:rPr lang="el-GR" dirty="0" smtClean="0">
                 <a:latin typeface="Cambria Math"/>
                 <a:ea typeface="Cambria Math"/>
               </a:rPr>
-              <a:t>β</a:t>
+              <a:t>α</a:t>
             </a:r>
             <a:r>
               <a:rPr lang="en-US" dirty="0" smtClean="0">
                 <a:latin typeface="Cambria Math"/>
                 <a:ea typeface="Cambria Math"/>
               </a:rPr>
-              <a:t> values that will be used for pruning – this will not always result in the mot optimal </a:t>
+              <a:t>-</a:t>
             </a:r>
             <a:r>
               <a:rPr lang="el-GR" dirty="0" smtClean="0">
                 <a:latin typeface="Cambria Math"/>
                 <a:ea typeface="Cambria Math"/>
               </a:rPr>
-              <a:t>α</a:t>
+              <a:t>β</a:t>
             </a:r>
             <a:r>
               <a:rPr lang="en-US" dirty="0" smtClean="0">
                 <a:latin typeface="Cambria Math"/>
                 <a:ea typeface="Cambria Math"/>
               </a:rPr>
-              <a:t>-</a:t>
+              <a:t> values for every other processor to see and use to prune.  This should result in full pruning but may have issues with simultaneous updates when two processors try to update the “new” best </a:t>
             </a:r>
             <a:r>
               <a:rPr lang="el-GR" dirty="0" smtClean="0">
                 <a:latin typeface="Cambria Math"/>
                 <a:ea typeface="Cambria Math"/>
               </a:rPr>
-              <a:t>β</a:t>
+              <a:t>α</a:t>
             </a:r>
             <a:r>
               <a:rPr lang="en-US" dirty="0" smtClean="0">
                 <a:latin typeface="Cambria Math"/>
                 <a:ea typeface="Cambria Math"/>
               </a:rPr>
-              <a:t> to prune with but will allow the most parallel work to be done</a:t>
-            </a:r>
-          </a:p>
-          <a:p>
+              <a:t>-</a:t>
+            </a:r>
+            <a:r>
+              <a:rPr lang="el-GR" dirty="0" smtClean="0">
+                <a:latin typeface="Cambria Math"/>
+                <a:ea typeface="Cambria Math"/>
+              </a:rPr>
+              <a:t>β</a:t>
+            </a:r>
             <a:r>
               <a:rPr lang="en-US" dirty="0" smtClean="0">
                 <a:latin typeface="Cambria Math"/>
                 <a:ea typeface="Cambria Math"/>
               </a:rPr>
-              <a:t>2) Each processor will </a:t>
-            </a:r>
-            <a:r>
-              <a:rPr lang="en-US" dirty="0" err="1" smtClean="0">
-                <a:latin typeface="Cambria Math"/>
-                <a:ea typeface="Cambria Math"/>
-              </a:rPr>
-              <a:t>asynchonously</a:t>
-            </a:r>
-            <a:r>
-              <a:rPr lang="en-US" dirty="0" smtClean="0">
-                <a:latin typeface="Cambria Math"/>
-                <a:ea typeface="Cambria Math"/>
-              </a:rPr>
-              <a:t> send and receive current best </a:t>
-            </a:r>
-            <a:r>
-              <a:rPr lang="el-GR" dirty="0" smtClean="0">
-                <a:latin typeface="Cambria Math"/>
-                <a:ea typeface="Cambria Math"/>
-              </a:rPr>
-              <a:t>α</a:t>
-            </a:r>
-            <a:r>
-              <a:rPr lang="en-US" dirty="0" smtClean="0">
-                <a:latin typeface="Cambria Math"/>
-                <a:ea typeface="Cambria Math"/>
-              </a:rPr>
-              <a:t>-</a:t>
-            </a:r>
-            <a:r>
-              <a:rPr lang="el-GR" dirty="0" smtClean="0">
-                <a:latin typeface="Cambria Math"/>
-                <a:ea typeface="Cambria Math"/>
-              </a:rPr>
-              <a:t>β</a:t>
-            </a:r>
-            <a:r>
-              <a:rPr lang="en-US" dirty="0" smtClean="0">
-                <a:latin typeface="Cambria Math"/>
-                <a:ea typeface="Cambria Math"/>
-              </a:rPr>
-              <a:t> values for every other processor to see and use to prune.  This should result in full pruning but may have issues with simultaneous updates when two processors try to update the “new” best </a:t>
-            </a:r>
-            <a:r>
-              <a:rPr lang="el-GR" dirty="0" smtClean="0">
-                <a:latin typeface="Cambria Math"/>
-                <a:ea typeface="Cambria Math"/>
-              </a:rPr>
-              <a:t>α</a:t>
-            </a:r>
-            <a:r>
-              <a:rPr lang="en-US" dirty="0" smtClean="0">
-                <a:latin typeface="Cambria Math"/>
-                <a:ea typeface="Cambria Math"/>
-              </a:rPr>
-              <a:t>-</a:t>
-            </a:r>
-            <a:r>
-              <a:rPr lang="el-GR" dirty="0" smtClean="0">
-                <a:latin typeface="Cambria Math"/>
-                <a:ea typeface="Cambria Math"/>
-              </a:rPr>
-              <a:t>β</a:t>
-            </a:r>
-            <a:r>
-              <a:rPr lang="en-US" dirty="0" smtClean="0">
-                <a:latin typeface="Cambria Math"/>
-                <a:ea typeface="Cambria Math"/>
-              </a:rPr>
               <a:t> values</a:t>
             </a:r>
           </a:p>
@@ -12320,13 +12252,7 @@
               <a:rPr lang="en-US" sz="3200" u="none" dirty="0" smtClean="0">
                 <a:latin typeface="Constantia" pitchFamily="18" charset="0"/>
               </a:rPr>
-              <a:t>Parallelizing Complexity Reduction </a:t>
-            </a:r>
-            <a:r>
-              <a:rPr lang="en-US" sz="3200" u="none" dirty="0" smtClean="0">
-                <a:latin typeface="Constantia" pitchFamily="18" charset="0"/>
-              </a:rPr>
-              <a:t>and Optimization </a:t>
+              <a:t>Parallelizing Complexity Reduction and Optimization </a:t>
             </a:r>
             <a:r>
               <a:rPr lang="en-US" sz="3200" u="none" dirty="0" smtClean="0">
@@ -12481,13 +12407,7 @@
               <a:rPr lang="en-US" dirty="0" smtClean="0">
                 <a:latin typeface="Constantia" pitchFamily="18" charset="0"/>
               </a:rPr>
-              <a:t> game tree as well as planning how we chose to parallelize the search space reduction portion.  </a:t>
-            </a:r>
-            <a:r>
-              <a:rPr lang="en-US" dirty="0" smtClean="0">
-                <a:latin typeface="Constantia" pitchFamily="18" charset="0"/>
-              </a:rPr>
-              <a:t>The first step will be to compare the parallelize </a:t>
+              <a:t> game tree as well as planning how we chose to parallelize the search space reduction portion.  The first step will be to compare the parallelize </a:t>
             </a:r>
             <a:r>
               <a:rPr lang="en-US" dirty="0" err="1" smtClean="0">
@@ -12600,11 +12520,17 @@
           <a:p>
             <a:r>
               <a:rPr lang="en-US" dirty="0" smtClean="0">
+                <a:solidFill>
+                  <a:srgbClr val="FF0000"/>
+                </a:solidFill>
                 <a:latin typeface="Constantia" pitchFamily="18" charset="0"/>
               </a:rPr>
               <a:t>Insert our references here</a:t>
             </a:r>
             <a:endParaRPr lang="en-US" dirty="0">
+              <a:solidFill>
+                <a:srgbClr val="FF0000"/>
+              </a:solidFill>
               <a:latin typeface="Constantia" pitchFamily="18" charset="0"/>
             </a:endParaRPr>
           </a:p>
@@ -13787,19 +13713,7 @@
                 <a:latin typeface="Cambria Math"/>
                 <a:ea typeface="Cambria Math"/>
               </a:rPr>
-              <a:t> </a:t>
-            </a:r>
-            <a:r>
-              <a:rPr lang="en-US" sz="1800" dirty="0" smtClean="0">
-                <a:solidFill>
-                  <a:schemeClr val="accent5">
-                    <a:lumMod val="50000"/>
-                  </a:schemeClr>
-                </a:solidFill>
-                <a:latin typeface="Cambria Math"/>
-                <a:ea typeface="Cambria Math"/>
-              </a:rPr>
-              <a:t>and is also non-trivial.</a:t>
+              <a:t> and is also non-trivial.</a:t>
             </a:r>
             <a:endParaRPr kumimoji="0" lang="en-US" sz="1800" b="0" i="0" u="none" strike="noStrike" kern="1200" cap="none" spc="0" normalizeH="0" baseline="0" noProof="0" dirty="0">
               <a:ln>
@@ -13870,18 +13784,7 @@
                 </a:solidFill>
                 <a:latin typeface="Constantia" pitchFamily="18" charset="0"/>
               </a:rPr>
-              <a:t>Optimization: </a:t>
-            </a:r>
-            <a:r>
-              <a:rPr lang="en-US" sz="3200" b="1" dirty="0" smtClean="0">
-                <a:solidFill>
-                  <a:schemeClr val="accent5">
-                    <a:lumMod val="50000"/>
-                  </a:schemeClr>
-                </a:solidFill>
-                <a:latin typeface="Constantia" pitchFamily="18" charset="0"/>
-              </a:rPr>
-              <a:t>α-</a:t>
+              <a:t>Optimization: α-</a:t>
             </a:r>
             <a:r>
               <a:rPr lang="el-GR" sz="3200" b="1" dirty="0" smtClean="0">
@@ -13991,41 +13894,7 @@
                 <a:ea typeface="+mn-ea"/>
                 <a:cs typeface="+mn-cs"/>
               </a:rPr>
-              <a:t> </a:t>
-            </a:r>
-            <a:r>
-              <a:rPr kumimoji="0" lang="en-US" sz="3200" b="1" i="0" u="none" strike="noStrike" kern="1200" cap="none" spc="0" normalizeH="0" noProof="0" dirty="0" smtClean="0">
-                <a:ln>
-                  <a:noFill/>
-                </a:ln>
-                <a:solidFill>
-                  <a:srgbClr val="FF0000"/>
-                </a:solidFill>
-                <a:effectLst/>
-                <a:uLnTx/>
-                <a:uFillTx/>
-                <a:latin typeface="Constantia" pitchFamily="18" charset="0"/>
-                <a:ea typeface="+mn-ea"/>
-                <a:cs typeface="+mn-cs"/>
-              </a:rPr>
-              <a:t>Approx</a:t>
-            </a:r>
-            <a:r>
-              <a:rPr kumimoji="0" lang="en-US" sz="3200" b="1" i="0" u="none" strike="noStrike" kern="1200" cap="none" spc="0" normalizeH="0" noProof="0" dirty="0" smtClean="0">
-                <a:ln>
-                  <a:noFill/>
-                </a:ln>
-                <a:solidFill>
-                  <a:srgbClr val="FF0000"/>
-                </a:solidFill>
-                <a:effectLst/>
-                <a:uLnTx/>
-                <a:uFillTx/>
-                <a:latin typeface="Constantia" pitchFamily="18" charset="0"/>
-                <a:ea typeface="+mn-ea"/>
-                <a:cs typeface="+mn-cs"/>
-              </a:rPr>
-              <a:t>. (the MIT paper) or both?</a:t>
+              <a:t> Approx. (the MIT paper) or both?</a:t>
             </a:r>
             <a:endParaRPr kumimoji="0" lang="en-US" sz="3200" b="1" i="0" u="none" strike="noStrike" kern="1200" cap="none" spc="0" normalizeH="0" baseline="0" noProof="0" dirty="0">
               <a:ln>
@@ -14147,7 +14016,7 @@
           <a:blip r:embed="rId2" cstate="print">
             <a:extLst>
               <a:ext uri="{28A0092B-C50C-407E-A947-70E740481C1C}">
-                <a14:useLocalDpi xmlns:a14="http://schemas.microsoft.com/office/drawing/2010/main" xmlns="" val="0"/>
+                <a14:useLocalDpi xmlns="" xmlns:a14="http://schemas.microsoft.com/office/drawing/2010/main" val="0"/>
               </a:ext>
             </a:extLst>
           </a:blip>
@@ -14195,7 +14064,7 @@
     </p:spTree>
     <p:extLst>
       <p:ext uri="{BB962C8B-B14F-4D97-AF65-F5344CB8AC3E}">
-        <p14:creationId xmlns:p14="http://schemas.microsoft.com/office/powerpoint/2010/main" xmlns="" val="2212419635"/>
+        <p14:creationId xmlns="" xmlns:p14="http://schemas.microsoft.com/office/powerpoint/2010/main" val="2212419635"/>
       </p:ext>
     </p:extLst>
   </p:cSld>

</xml_diff>

<commit_message>
final poster, graphic qualities still suck
</commit_message>
<xml_diff>
--- a/CS205 Poster - Chen Sim 2013.pptx
+++ b/CS205 Poster - Chen Sim 2013.pptx
@@ -110,7 +110,7 @@
   </p:defaultTextStyle>
   <p:extLst>
     <p:ext uri="{EFAFB233-063F-42B5-8137-9DF3F51BA10A}">
-      <p15:sldGuideLst xmlns:p15="http://schemas.microsoft.com/office/powerpoint/2012/main">
+      <p15:sldGuideLst xmlns:p15="http://schemas.microsoft.com/office/powerpoint/2012/main" xmlns="">
         <p15:guide id="1" orient="horz" pos="2212">
           <p15:clr>
             <a:srgbClr val="A4A3A4"/>
@@ -144,7 +144,7 @@
       </p15:sldGuideLst>
     </p:ext>
     <p:ext uri="{2D200454-40CA-4A62-9FC3-DE9A4176ACB9}">
-      <p15:notesGuideLst xmlns:p15="http://schemas.microsoft.com/office/powerpoint/2012/main">
+      <p15:notesGuideLst xmlns:p15="http://schemas.microsoft.com/office/powerpoint/2012/main" xmlns="">
         <p15:guide id="1" orient="horz" pos="2880">
           <p15:clr>
             <a:srgbClr val="A4A3A4"/>
@@ -424,7 +424,7 @@
     </p:spTree>
     <p:extLst>
       <p:ext uri="{BB962C8B-B14F-4D97-AF65-F5344CB8AC3E}">
-        <p14:creationId xmlns:p14="http://schemas.microsoft.com/office/powerpoint/2010/main" val="3784840913"/>
+        <p14:creationId xmlns:p14="http://schemas.microsoft.com/office/powerpoint/2010/main" xmlns="" val="3784840913"/>
       </p:ext>
     </p:extLst>
   </p:cSld>
@@ -11482,10 +11482,10 @@
           <p:nvPr/>
         </p:nvPicPr>
         <p:blipFill>
-          <a:blip r:embed="rId2">
+          <a:blip r:embed="rId2" cstate="print">
             <a:extLst>
               <a:ext uri="{28A0092B-C50C-407E-A947-70E740481C1C}">
-                <a14:useLocalDpi xmlns:a14="http://schemas.microsoft.com/office/drawing/2010/main" val="0"/>
+                <a14:useLocalDpi xmlns:a14="http://schemas.microsoft.com/office/drawing/2010/main" xmlns="" val="0"/>
               </a:ext>
             </a:extLst>
           </a:blip>
@@ -11496,8 +11496,8 @@
         </p:blipFill>
         <p:spPr bwMode="auto">
           <a:xfrm>
-            <a:off x="15829908" y="4265304"/>
-            <a:ext cx="8163713" cy="6344597"/>
+            <a:off x="15059130" y="4752984"/>
+            <a:ext cx="8964971" cy="5637387"/>
           </a:xfrm>
           <a:prstGeom prst="rect">
             <a:avLst/>
@@ -11505,7 +11505,7 @@
           <a:noFill/>
           <a:extLst>
             <a:ext uri="{909E8E84-426E-40DD-AFC4-6F175D3DCCD1}">
-              <a14:hiddenFill xmlns:a14="http://schemas.microsoft.com/office/drawing/2010/main">
+              <a14:hiddenFill xmlns:a14="http://schemas.microsoft.com/office/drawing/2010/main" xmlns="">
                 <a:solidFill>
                   <a:srgbClr val="FFFFFF"/>
                 </a:solidFill>
@@ -11708,7 +11708,7 @@
         </p:nvSpPr>
         <p:spPr>
           <a:xfrm>
-            <a:off x="691756" y="3510047"/>
+            <a:off x="691756" y="3601487"/>
             <a:ext cx="7536656" cy="624326"/>
           </a:xfrm>
         </p:spPr>
@@ -11740,7 +11740,7 @@
         </p:nvSpPr>
         <p:spPr>
           <a:xfrm>
-            <a:off x="628544" y="12262908"/>
+            <a:off x="628544" y="12537228"/>
             <a:ext cx="7537847" cy="624326"/>
           </a:xfrm>
         </p:spPr>
@@ -11778,8 +11778,8 @@
         </p:nvSpPr>
         <p:spPr>
           <a:xfrm>
-            <a:off x="8687069" y="4026220"/>
-            <a:ext cx="6974109" cy="6977678"/>
+            <a:off x="8717549" y="4087180"/>
+            <a:ext cx="6372061" cy="7874938"/>
           </a:xfrm>
         </p:spPr>
         <p:txBody>
@@ -11790,7 +11790,7 @@
               <a:rPr lang="en-US" sz="2000" dirty="0" smtClean="0">
                 <a:latin typeface="Constantia" pitchFamily="18" charset="0"/>
               </a:rPr>
-              <a:t>    A </a:t>
+              <a:t>A </a:t>
             </a:r>
             <a:r>
               <a:rPr lang="en-US" sz="2000" dirty="0" err="1" smtClean="0">
@@ -11825,9 +11825,22 @@
           <a:p>
             <a:r>
               <a:rPr lang="en-US" sz="2000" dirty="0" smtClean="0">
+                <a:latin typeface="Cambria Math"/>
+                <a:ea typeface="Cambria Math"/>
+              </a:rPr>
+              <a:t>I</a:t>
+            </a:r>
+            <a:r>
+              <a:rPr lang="en-US" sz="2000" dirty="0" smtClean="0">
                 <a:latin typeface="Constantia" pitchFamily="18" charset="0"/>
               </a:rPr>
-              <a:t>    In principle, the heuristic computation could also be done by GPU but because of the nature of the various heuristics – only needing to check the immediate squares affected by the last move played, the actual heuristic computation is not as time consuming as simply computing over the space of possible game states.</a:t>
+              <a:t>n </a:t>
+            </a:r>
+            <a:r>
+              <a:rPr lang="en-US" sz="2000" dirty="0" smtClean="0">
+                <a:latin typeface="Constantia" pitchFamily="18" charset="0"/>
+              </a:rPr>
+              <a:t>principle, the heuristic computation could also be done by GPU but because of the nature of the various heuristics – only needing to check the immediate squares affected by the last move played, the actual heuristic computation is not as time consuming as simply computing over the space of possible game states.</a:t>
             </a:r>
           </a:p>
           <a:p>
@@ -11893,7 +11906,7 @@
         </p:nvSpPr>
         <p:spPr>
           <a:xfrm>
-            <a:off x="8687068" y="17648029"/>
+            <a:off x="8687068" y="18105229"/>
             <a:ext cx="15540038" cy="3210493"/>
           </a:xfrm>
         </p:spPr>
@@ -11905,7 +11918,13 @@
               <a:rPr lang="en-US" dirty="0" smtClean="0">
                 <a:latin typeface="Constantia" pitchFamily="18" charset="0"/>
               </a:rPr>
-              <a:t>Parallelizing search space reduction is an area that we will experiment with.  The easiest technique would be  to run this optimization portion serially, - meaning each processor will use the optimization algorithm from its own first node and below.  This should give a speedup over the non-pruned version.  However, this setup will not allow for the information on one branch to prune the other branches.  As discussed above, full </a:t>
+              <a:t>Parallelizing search space reduction is an area that we will experiment with.  The easiest technique would be  to run this optimization portion serially, - meaning each processor will use the optimization algorithm from its own first node and below.  This should give a speedup over the non-pruned version.  However, this setup will not allow for the information on one branch to prune the other branches.  </a:t>
+            </a:r>
+            <a:r>
+              <a:rPr lang="en-US" dirty="0" smtClean="0">
+                <a:latin typeface="Constantia" pitchFamily="18" charset="0"/>
+              </a:rPr>
+              <a:t>Complete </a:t>
             </a:r>
             <a:r>
               <a:rPr lang="el-GR" dirty="0" smtClean="0">
@@ -11933,7 +11952,21 @@
                 <a:latin typeface="Cambria Math"/>
                 <a:ea typeface="Cambria Math"/>
               </a:rPr>
-              <a:t> is naturally a serial algorithm as the more that is searched serially allows for more pruning to follow.  Below are a couple of methods we have considered to parallelize </a:t>
+              <a:t> </a:t>
+            </a:r>
+            <a:r>
+              <a:rPr lang="en-US" dirty="0" smtClean="0">
+                <a:latin typeface="Cambria Math"/>
+                <a:ea typeface="Cambria Math"/>
+              </a:rPr>
+              <a:t>pruning is by nature, a </a:t>
+            </a:r>
+            <a:r>
+              <a:rPr lang="en-US" dirty="0" smtClean="0">
+                <a:latin typeface="Cambria Math"/>
+                <a:ea typeface="Cambria Math"/>
+              </a:rPr>
+              <a:t>serial algorithm as the more that is searched serially allows for more pruning to follow.  Below are a couple of methods we have considered to parallelize </a:t>
             </a:r>
             <a:r>
               <a:rPr lang="el-GR" dirty="0" smtClean="0">
@@ -12035,21 +12068,35 @@
                 <a:latin typeface="Cambria Math"/>
                 <a:ea typeface="Cambria Math"/>
               </a:rPr>
-              <a:t>2) Each processor will </a:t>
+              <a:t>2) Each processor will asynchronously send and receive current best </a:t>
+            </a:r>
+            <a:r>
+              <a:rPr lang="el-GR" dirty="0" smtClean="0">
+                <a:latin typeface="Cambria Math"/>
+                <a:ea typeface="Cambria Math"/>
+              </a:rPr>
+              <a:t>α</a:t>
             </a:r>
             <a:r>
               <a:rPr lang="en-US" dirty="0" smtClean="0">
                 <a:latin typeface="Cambria Math"/>
                 <a:ea typeface="Cambria Math"/>
               </a:rPr>
-              <a:t>asynchronously </a:t>
+              <a:t>-</a:t>
+            </a:r>
+            <a:r>
+              <a:rPr lang="el-GR" dirty="0" smtClean="0">
+                <a:latin typeface="Cambria Math"/>
+                <a:ea typeface="Cambria Math"/>
+              </a:rPr>
+              <a:t>β</a:t>
             </a:r>
             <a:r>
               <a:rPr lang="en-US" dirty="0" smtClean="0">
                 <a:latin typeface="Cambria Math"/>
                 <a:ea typeface="Cambria Math"/>
               </a:rPr>
-              <a:t>send and receive current best </a:t>
+              <a:t> values for every other processor to see and use to prune.  This should result in full pruning but may have issues with simultaneous updates when two processors try to update the “new” best </a:t>
             </a:r>
             <a:r>
               <a:rPr lang="el-GR" dirty="0" smtClean="0">
@@ -12077,34 +12124,6 @@
                 <a:latin typeface="Cambria Math"/>
                 <a:ea typeface="Cambria Math"/>
               </a:rPr>
-              <a:t> values for every other processor to see and use to prune.  This should result in full pruning but may have issues with simultaneous updates when two processors try to update the “new” best </a:t>
-            </a:r>
-            <a:r>
-              <a:rPr lang="el-GR" dirty="0" smtClean="0">
-                <a:latin typeface="Cambria Math"/>
-                <a:ea typeface="Cambria Math"/>
-              </a:rPr>
-              <a:t>α</a:t>
-            </a:r>
-            <a:r>
-              <a:rPr lang="en-US" dirty="0" smtClean="0">
-                <a:latin typeface="Cambria Math"/>
-                <a:ea typeface="Cambria Math"/>
-              </a:rPr>
-              <a:t>-</a:t>
-            </a:r>
-            <a:r>
-              <a:rPr lang="el-GR" dirty="0" smtClean="0">
-                <a:latin typeface="Cambria Math"/>
-                <a:ea typeface="Cambria Math"/>
-              </a:rPr>
-              <a:t>β</a:t>
-            </a:r>
-            <a:r>
-              <a:rPr lang="en-US" dirty="0" smtClean="0">
-                <a:latin typeface="Cambria Math"/>
-                <a:ea typeface="Cambria Math"/>
-              </a:rPr>
               <a:t> values</a:t>
             </a:r>
           </a:p>
@@ -12122,8 +12141,8 @@
         </p:nvSpPr>
         <p:spPr>
           <a:xfrm>
-            <a:off x="8687067" y="16594602"/>
-            <a:ext cx="15540038" cy="1116768"/>
+            <a:off x="8687067" y="17479676"/>
+            <a:ext cx="15540038" cy="624326"/>
           </a:xfrm>
         </p:spPr>
         <p:txBody>
@@ -12134,83 +12153,13 @@
               <a:rPr lang="en-US" sz="3200" u="none" dirty="0" smtClean="0">
                 <a:latin typeface="Constantia" pitchFamily="18" charset="0"/>
               </a:rPr>
-              <a:t>Parallelizing Complexity Reduction and Optimization </a:t>
+              <a:t>Parallelizing Complexity Reduction and </a:t>
             </a:r>
             <a:r>
               <a:rPr lang="en-US" sz="3200" u="none" dirty="0" smtClean="0">
-                <a:solidFill>
-                  <a:srgbClr val="FF0000"/>
-                </a:solidFill>
                 <a:latin typeface="Constantia" pitchFamily="18" charset="0"/>
               </a:rPr>
-              <a:t>(</a:t>
-            </a:r>
-            <a:r>
-              <a:rPr lang="en-US" sz="3200" u="none" dirty="0" err="1" smtClean="0">
-                <a:solidFill>
-                  <a:srgbClr val="FF0000"/>
-                </a:solidFill>
-                <a:latin typeface="Constantia" pitchFamily="18" charset="0"/>
-              </a:rPr>
-              <a:t>im</a:t>
-            </a:r>
-            <a:r>
-              <a:rPr lang="en-US" sz="3200" u="none" dirty="0" smtClean="0">
-                <a:solidFill>
-                  <a:srgbClr val="FF0000"/>
-                </a:solidFill>
-                <a:latin typeface="Constantia" pitchFamily="18" charset="0"/>
-              </a:rPr>
-              <a:t> talking about </a:t>
-            </a:r>
-            <a:r>
-              <a:rPr lang="el-GR" sz="3200" u="none" dirty="0" smtClean="0">
-                <a:solidFill>
-                  <a:srgbClr val="FF0000"/>
-                </a:solidFill>
-                <a:latin typeface="Cambria Math"/>
-                <a:ea typeface="Cambria Math"/>
-              </a:rPr>
-              <a:t>α</a:t>
-            </a:r>
-            <a:r>
-              <a:rPr lang="en-US" sz="3200" u="none" dirty="0" smtClean="0">
-                <a:solidFill>
-                  <a:srgbClr val="FF0000"/>
-                </a:solidFill>
-                <a:latin typeface="Cambria Math"/>
-                <a:ea typeface="Cambria Math"/>
-              </a:rPr>
-              <a:t>-</a:t>
-            </a:r>
-            <a:r>
-              <a:rPr lang="el-GR" sz="3200" u="none" dirty="0" smtClean="0">
-                <a:solidFill>
-                  <a:srgbClr val="FF0000"/>
-                </a:solidFill>
-                <a:latin typeface="Cambria Math"/>
-                <a:ea typeface="Cambria Math"/>
-              </a:rPr>
-              <a:t>β</a:t>
-            </a:r>
-            <a:r>
-              <a:rPr lang="en-US" sz="3200" u="none" dirty="0" smtClean="0">
-                <a:solidFill>
-                  <a:srgbClr val="FF0000"/>
-                </a:solidFill>
-                <a:latin typeface="Cambria Math"/>
-                <a:ea typeface="Cambria Math"/>
-              </a:rPr>
-              <a:t> </a:t>
-            </a:r>
-            <a:r>
-              <a:rPr lang="en-US" sz="3200" u="none" dirty="0" smtClean="0">
-                <a:solidFill>
-                  <a:srgbClr val="FF0000"/>
-                </a:solidFill>
-                <a:latin typeface="Constantia" pitchFamily="18" charset="0"/>
-              </a:rPr>
-              <a:t>pruning – hope it makes sense parallel read this for sure)</a:t>
+              <a:t>Optimization</a:t>
             </a:r>
             <a:endParaRPr lang="en-US" sz="3200" u="none" dirty="0">
               <a:solidFill>
@@ -12233,7 +12182,7 @@
         </p:nvSpPr>
         <p:spPr>
           <a:xfrm>
-            <a:off x="24679152" y="3464327"/>
+            <a:off x="24679152" y="3555767"/>
             <a:ext cx="7535264" cy="624326"/>
           </a:xfrm>
         </p:spPr>
@@ -12265,26 +12214,31 @@
         </p:nvSpPr>
         <p:spPr>
           <a:xfrm>
-            <a:off x="24599982" y="4310007"/>
-            <a:ext cx="3497036" cy="5592684"/>
+            <a:off x="24599982" y="4149987"/>
+            <a:ext cx="3497036" cy="6146682"/>
           </a:xfrm>
         </p:spPr>
         <p:txBody>
           <a:bodyPr/>
           <a:lstStyle/>
           <a:p>
-            <a:pPr algn="just"/>
             <a:r>
               <a:rPr lang="en-US" dirty="0" smtClean="0">
                 <a:latin typeface="Constantia" pitchFamily="18" charset="0"/>
               </a:rPr>
-              <a:t>    We </a:t>
+              <a:t> </a:t>
             </a:r>
             <a:r>
               <a:rPr lang="en-US" dirty="0" smtClean="0">
                 <a:latin typeface="Constantia" pitchFamily="18" charset="0"/>
               </a:rPr>
-              <a:t>are currently in the midst of parallelizing the </a:t>
+              <a:t>We are currently </a:t>
+            </a:r>
+            <a:r>
+              <a:rPr lang="en-US" dirty="0" smtClean="0">
+                <a:latin typeface="Constantia" pitchFamily="18" charset="0"/>
+              </a:rPr>
+              <a:t>in the midst of parallelizing the </a:t>
             </a:r>
             <a:r>
               <a:rPr lang="en-US" dirty="0" err="1" smtClean="0">
@@ -12308,29 +12262,8 @@
               <a:rPr lang="en-US" dirty="0" smtClean="0">
                 <a:latin typeface="Constantia" pitchFamily="18" charset="0"/>
               </a:rPr>
-              <a:t> to the </a:t>
-            </a:r>
-            <a:r>
-              <a:rPr lang="en-US" dirty="0" smtClean="0">
-                <a:latin typeface="Constantia" pitchFamily="18" charset="0"/>
-              </a:rPr>
-              <a:t>serial </a:t>
-            </a:r>
-            <a:r>
-              <a:rPr lang="en-US" dirty="0" smtClean="0">
-                <a:latin typeface="Constantia" pitchFamily="18" charset="0"/>
-              </a:rPr>
-              <a:t>version.  For reference, our serial version, thinking just 2 moves ahead takes 10 seconds per turn pre search-space reduction.  We hope to use these numbers to calculate our efficiency for the parallel version – which we expect something close to 1 – as we are perfectly dividing the number of nodes across the processors if we do not prune the tree beforehand</a:t>
-            </a:r>
-            <a:r>
-              <a:rPr lang="en-US" dirty="0" smtClean="0">
-                <a:latin typeface="Constantia" pitchFamily="18" charset="0"/>
-              </a:rPr>
-              <a:t>.</a:t>
-            </a:r>
-            <a:endParaRPr lang="en-US" dirty="0" smtClean="0">
-              <a:latin typeface="Constantia" pitchFamily="18" charset="0"/>
-            </a:endParaRPr>
+              <a:t> to the serial version.  For reference, our serial version, thinking just 2 moves ahead takes 10 seconds per turn pre search-space reduction.  We hope to use these numbers to calculate our efficiency for the parallel version – which we expect something close to 1 – as we are perfectly dividing the number of nodes across the processors if we do not prune the tree beforehand.</a:t>
+            </a:r>
           </a:p>
         </p:txBody>
       </p:sp>
@@ -12346,7 +12279,7 @@
         </p:nvSpPr>
         <p:spPr>
           <a:xfrm>
-            <a:off x="24675378" y="17762401"/>
+            <a:off x="24675378" y="17724301"/>
             <a:ext cx="7535264" cy="624326"/>
           </a:xfrm>
         </p:spPr>
@@ -12427,7 +12360,7 @@
         </p:nvSpPr>
         <p:spPr>
           <a:xfrm>
-            <a:off x="24679152" y="19253975"/>
+            <a:off x="24679152" y="19292589"/>
             <a:ext cx="7535264" cy="624326"/>
           </a:xfrm>
         </p:spPr>
@@ -12459,7 +12392,7 @@
         </p:nvSpPr>
         <p:spPr>
           <a:xfrm>
-            <a:off x="24679152" y="19882172"/>
+            <a:off x="24679152" y="19794995"/>
             <a:ext cx="7539038" cy="1160701"/>
           </a:xfrm>
         </p:spPr>
@@ -12536,8 +12469,8 @@
         </p:nvSpPr>
         <p:spPr>
           <a:xfrm>
-            <a:off x="692411" y="17992165"/>
-            <a:ext cx="7542610" cy="2988894"/>
+            <a:off x="692411" y="18129325"/>
+            <a:ext cx="7542610" cy="3210493"/>
           </a:xfrm>
         </p:spPr>
         <p:txBody>
@@ -12548,7 +12481,7 @@
               <a:rPr lang="en-US" dirty="0" smtClean="0">
                 <a:latin typeface="Constantia" pitchFamily="18" charset="0"/>
               </a:rPr>
-              <a:t>Heuristic: “X-in-a-row”</a:t>
+              <a:t>Current Heuristic: “X-in-a-row”</a:t>
             </a:r>
           </a:p>
           <a:p>
@@ -12556,10 +12489,44 @@
               <a:rPr lang="en-US" dirty="0" smtClean="0">
                 <a:latin typeface="Constantia" pitchFamily="18" charset="0"/>
               </a:rPr>
-              <a:t>Currently, we evaluate (efficiently) the number of 1-in-a-row, 2-in-a-row, 3-in-a-row, 4-in-a-row, and 5-in-a-rows (game over) for each player on the board. We then evaluate the utility by taking the dot product of this vector of numbers with another vector of exponentially increasing weights, to weigh longer combos higher than shorter combos.</a:t>
-            </a:r>
-          </a:p>
-          <a:p>
+              <a:t>We evaluate </a:t>
+            </a:r>
+            <a:r>
+              <a:rPr lang="en-US" dirty="0" smtClean="0">
+                <a:latin typeface="Constantia" pitchFamily="18" charset="0"/>
+              </a:rPr>
+              <a:t>(efficiently) the number of 1-in-a-row, 2-in-a-row, 3-in-a-row, </a:t>
+            </a:r>
+            <a:r>
+              <a:rPr lang="en-US" dirty="0" smtClean="0">
+                <a:latin typeface="Constantia" pitchFamily="18" charset="0"/>
+              </a:rPr>
+              <a:t>4-in-a-row</a:t>
+            </a:r>
+            <a:r>
+              <a:rPr lang="en-US" dirty="0" smtClean="0">
+                <a:latin typeface="Constantia" pitchFamily="18" charset="0"/>
+              </a:rPr>
+              <a:t>, and 5-in-a-rows (game over) for each player on the board. We then evaluate the utility by taking the dot product of this vector of numbers with another vector of exponentially increasing weights, to weigh longer combos higher than shorter combos</a:t>
+            </a:r>
+            <a:r>
+              <a:rPr lang="en-US" dirty="0" smtClean="0">
+                <a:latin typeface="Constantia" pitchFamily="18" charset="0"/>
+              </a:rPr>
+              <a:t>.  This </a:t>
+            </a:r>
+            <a:r>
+              <a:rPr lang="en-US" dirty="0" smtClean="0">
+                <a:latin typeface="Constantia" pitchFamily="18" charset="0"/>
+              </a:rPr>
+              <a:t> </a:t>
+            </a:r>
+            <a:r>
+              <a:rPr lang="en-US" dirty="0" smtClean="0">
+                <a:latin typeface="Constantia" pitchFamily="18" charset="0"/>
+              </a:rPr>
+              <a:t>heuristic can be adjusted but we feel with proper weighting of the X-in-a-row for scoring, this heuristic will be efficient.</a:t>
+            </a:r>
             <a:endParaRPr lang="en-US" dirty="0">
               <a:latin typeface="Constantia" pitchFamily="18" charset="0"/>
             </a:endParaRPr>
@@ -12587,7 +12554,19 @@
               <a:rPr lang="en-US" dirty="0" smtClean="0">
                 <a:latin typeface="Constantia" pitchFamily="18" charset="0"/>
               </a:rPr>
-              <a:t>tree essentially maximizes this score assuming that the opponent will play optimally.</a:t>
+              <a:t>tree essentially maximizes this </a:t>
+            </a:r>
+            <a:r>
+              <a:rPr lang="en-US" dirty="0" smtClean="0">
+                <a:latin typeface="Constantia" pitchFamily="18" charset="0"/>
+              </a:rPr>
+              <a:t>score, no matter what the heuristic is, </a:t>
+            </a:r>
+            <a:r>
+              <a:rPr lang="en-US" dirty="0" smtClean="0">
+                <a:latin typeface="Constantia" pitchFamily="18" charset="0"/>
+              </a:rPr>
+              <a:t>assuming that the opponent will play optimally.</a:t>
             </a:r>
             <a:endParaRPr lang="en-US" dirty="0">
               <a:latin typeface="Constantia" pitchFamily="18" charset="0"/>
@@ -12607,8 +12586,8 @@
         </p:nvSpPr>
         <p:spPr>
           <a:xfrm>
-            <a:off x="24668032" y="18382510"/>
-            <a:ext cx="7542610" cy="939102"/>
+            <a:off x="24698512" y="18226707"/>
+            <a:ext cx="7542610" cy="1369835"/>
           </a:xfrm>
         </p:spPr>
         <p:txBody>
@@ -12671,6 +12650,8 @@
               </a:rPr>
               <a:t>).</a:t>
             </a:r>
+          </a:p>
+          <a:p>
             <a:endParaRPr lang="en-US" dirty="0">
               <a:latin typeface="Constantia" pitchFamily="18" charset="0"/>
             </a:endParaRPr>
@@ -12986,18 +12967,30 @@
         </p:nvSpPr>
         <p:spPr/>
       </p:sp>
-      <p:sp>
-        <p:nvSpPr>
-          <p:cNvPr id="217" name="Picture Placeholder 216"/>
-          <p:cNvSpPr>
-            <a:spLocks noGrp="1"/>
-          </p:cNvSpPr>
+      <p:pic>
+        <p:nvPicPr>
+          <p:cNvPr id="67" name="Picture Placeholder 66" descr="800px-AB_pruning.svg.png"/>
+          <p:cNvPicPr>
+            <a:picLocks noGrp="1" noChangeAspect="1"/>
+          </p:cNvPicPr>
           <p:nvPr>
             <p:ph type="pic" sz="quarter" idx="135"/>
           </p:nvPr>
-        </p:nvSpPr>
-        <p:spPr/>
-      </p:sp>
+        </p:nvPicPr>
+        <p:blipFill>
+          <a:blip r:embed="rId3" cstate="print"/>
+          <a:srcRect t="128" b="128"/>
+          <a:stretch>
+            <a:fillRect/>
+          </a:stretch>
+        </p:blipFill>
+        <p:spPr>
+          <a:xfrm>
+            <a:off x="9106218" y="11811221"/>
+            <a:ext cx="10371137" cy="5249862"/>
+          </a:xfrm>
+        </p:spPr>
+      </p:pic>
       <p:sp>
         <p:nvSpPr>
           <p:cNvPr id="218" name="Text Placeholder 217"/>
@@ -13399,7 +13392,7 @@
         </p:nvSpPr>
         <p:spPr>
           <a:xfrm>
-            <a:off x="24675378" y="10257255"/>
+            <a:off x="24675378" y="10508715"/>
             <a:ext cx="7535264" cy="624326"/>
           </a:xfrm>
           <a:prstGeom prst="rect">
@@ -13478,7 +13471,7 @@
         </p:nvSpPr>
         <p:spPr>
           <a:xfrm>
-            <a:off x="24772732" y="11002087"/>
+            <a:off x="24772732" y="10941127"/>
             <a:ext cx="7535264" cy="6608347"/>
           </a:xfrm>
           <a:prstGeom prst="rect">
@@ -13728,7 +13721,7 @@
         </p:nvSpPr>
         <p:spPr>
           <a:xfrm>
-            <a:off x="8687067" y="10714455"/>
+            <a:off x="8687067" y="11186895"/>
             <a:ext cx="15540037" cy="624326"/>
           </a:xfrm>
           <a:prstGeom prst="rect">
@@ -13799,10 +13792,10 @@
                 <a:ea typeface="+mn-ea"/>
                 <a:cs typeface="+mn-cs"/>
               </a:rPr>
-              <a:t> Pruning</a:t>
-            </a:r>
-            <a:r>
-              <a:rPr kumimoji="0" lang="en-US" sz="3200" b="1" i="0" u="none" strike="noStrike" kern="1200" cap="none" spc="0" normalizeH="0" noProof="0" dirty="0" smtClean="0">
+              <a:t> </a:t>
+            </a:r>
+            <a:r>
+              <a:rPr kumimoji="0" lang="en-US" sz="3200" b="1" i="0" u="none" strike="noStrike" kern="1200" cap="none" spc="0" normalizeH="0" baseline="0" noProof="0" dirty="0" smtClean="0">
                 <a:ln>
                   <a:noFill/>
                 </a:ln>
@@ -13818,67 +13811,7 @@
                 <a:ea typeface="+mn-ea"/>
                 <a:cs typeface="+mn-cs"/>
               </a:rPr>
-              <a:t> </a:t>
-            </a:r>
-            <a:r>
-              <a:rPr lang="en-US" sz="3200" b="1" dirty="0" smtClean="0">
-                <a:solidFill>
-                  <a:srgbClr val="FF0000"/>
-                </a:solidFill>
-                <a:latin typeface="Constantia" pitchFamily="18" charset="0"/>
-              </a:rPr>
-              <a:t>or</a:t>
-            </a:r>
-            <a:r>
-              <a:rPr kumimoji="0" lang="en-US" sz="3200" b="1" i="0" u="none" strike="noStrike" kern="1200" cap="none" spc="0" normalizeH="0" noProof="0" dirty="0" smtClean="0">
-                <a:ln>
-                  <a:noFill/>
-                </a:ln>
-                <a:solidFill>
-                  <a:srgbClr val="FF0000"/>
-                </a:solidFill>
-                <a:effectLst/>
-                <a:uLnTx/>
-                <a:uFillTx/>
-                <a:latin typeface="Constantia" pitchFamily="18" charset="0"/>
-                <a:ea typeface="+mn-ea"/>
-                <a:cs typeface="+mn-cs"/>
-              </a:rPr>
-              <a:t> </a:t>
-            </a:r>
-            <a:r>
-              <a:rPr kumimoji="0" lang="en-US" sz="3200" b="1" i="0" u="none" strike="noStrike" kern="1200" cap="none" spc="0" normalizeH="0" noProof="0" dirty="0" err="1" smtClean="0">
-                <a:ln>
-                  <a:noFill/>
-                </a:ln>
-                <a:solidFill>
-                  <a:srgbClr val="FF0000"/>
-                </a:solidFill>
-                <a:effectLst/>
-                <a:uLnTx/>
-                <a:uFillTx/>
-                <a:latin typeface="Constantia" pitchFamily="18" charset="0"/>
-                <a:ea typeface="+mn-ea"/>
-                <a:cs typeface="+mn-cs"/>
-              </a:rPr>
-              <a:t>Minimax</a:t>
-            </a:r>
-            <a:r>
-              <a:rPr kumimoji="0" lang="en-US" sz="3200" b="1" i="0" u="none" strike="noStrike" kern="1200" cap="none" spc="0" normalizeH="0" noProof="0" dirty="0" smtClean="0">
-                <a:ln>
-                  <a:noFill/>
-                </a:ln>
-                <a:solidFill>
-                  <a:srgbClr val="FF0000"/>
-                </a:solidFill>
-                <a:effectLst/>
-                <a:uLnTx/>
-                <a:uFillTx/>
-                <a:latin typeface="Constantia" pitchFamily="18" charset="0"/>
-                <a:ea typeface="+mn-ea"/>
-                <a:cs typeface="+mn-cs"/>
-              </a:rPr>
-              <a:t> Approx. (the MIT paper) or both?</a:t>
+              <a:t>Pruning</a:t>
             </a:r>
             <a:endParaRPr kumimoji="0" lang="en-US" sz="3200" b="1" i="0" u="none" strike="noStrike" kern="1200" cap="none" spc="0" normalizeH="0" baseline="0" noProof="0" dirty="0">
               <a:ln>
@@ -13906,10 +13839,10 @@
           <p:nvPr/>
         </p:nvPicPr>
         <p:blipFill>
-          <a:blip r:embed="rId3" cstate="print">
+          <a:blip r:embed="rId4" cstate="print">
             <a:extLst>
               <a:ext uri="{28A0092B-C50C-407E-A947-70E740481C1C}">
-                <a14:useLocalDpi xmlns:a14="http://schemas.microsoft.com/office/drawing/2010/main" val="0"/>
+                <a14:useLocalDpi xmlns:a14="http://schemas.microsoft.com/office/drawing/2010/main" xmlns="" val="0"/>
               </a:ext>
             </a:extLst>
           </a:blip>
@@ -13941,7 +13874,7 @@
           </p:nvPr>
         </p:nvPicPr>
         <p:blipFill>
-          <a:blip r:embed="rId4" cstate="print"/>
+          <a:blip r:embed="rId5" cstate="print"/>
           <a:srcRect t="745" b="745"/>
           <a:stretch>
             <a:fillRect/>
@@ -13962,8 +13895,8 @@
         </p:nvSpPr>
         <p:spPr bwMode="auto">
           <a:xfrm>
-            <a:off x="17606470" y="6952887"/>
-            <a:ext cx="3058970" cy="3674126"/>
+            <a:off x="16946880" y="7132320"/>
+            <a:ext cx="3459480" cy="3258051"/>
           </a:xfrm>
           <a:prstGeom prst="rect">
             <a:avLst/>
@@ -14005,8 +13938,8 @@
         </p:nvSpPr>
         <p:spPr bwMode="auto">
           <a:xfrm>
-            <a:off x="20762793" y="6952888"/>
-            <a:ext cx="3111359" cy="3657014"/>
+            <a:off x="20427513" y="7132320"/>
+            <a:ext cx="3596588" cy="3258051"/>
           </a:xfrm>
           <a:prstGeom prst="rect">
             <a:avLst/>
@@ -14049,10 +13982,10 @@
           <p:nvPr/>
         </p:nvPicPr>
         <p:blipFill>
-          <a:blip r:embed="rId2">
+          <a:blip r:embed="rId2" cstate="print">
             <a:extLst>
               <a:ext uri="{28A0092B-C50C-407E-A947-70E740481C1C}">
-                <a14:useLocalDpi xmlns:a14="http://schemas.microsoft.com/office/drawing/2010/main" val="0"/>
+                <a14:useLocalDpi xmlns:a14="http://schemas.microsoft.com/office/drawing/2010/main" xmlns="" val="0"/>
               </a:ext>
             </a:extLst>
           </a:blip>
@@ -14063,7 +13996,7 @@
         </p:blipFill>
         <p:spPr bwMode="auto">
           <a:xfrm>
-            <a:off x="692411" y="12958528"/>
+            <a:off x="692411" y="13255708"/>
             <a:ext cx="7459142" cy="4843064"/>
           </a:xfrm>
           <a:prstGeom prst="rect">
@@ -14072,48 +14005,7 @@
           <a:noFill/>
           <a:extLst>
             <a:ext uri="{909E8E84-426E-40DD-AFC4-6F175D3DCCD1}">
-              <a14:hiddenFill xmlns:a14="http://schemas.microsoft.com/office/drawing/2010/main">
-                <a:solidFill>
-                  <a:srgbClr val="FFFFFF"/>
-                </a:solidFill>
-              </a14:hiddenFill>
-            </a:ext>
-          </a:extLst>
-        </p:spPr>
-      </p:pic>
-      <p:pic>
-        <p:nvPicPr>
-          <p:cNvPr id="1030" name="Picture 6" descr="http://pages.cs.wisc.edu/~dyer/cs540/notes/gametree.gif"/>
-          <p:cNvPicPr>
-            <a:picLocks noChangeAspect="1" noChangeArrowheads="1"/>
-          </p:cNvPicPr>
-          <p:nvPr/>
-        </p:nvPicPr>
-        <p:blipFill>
-          <a:blip r:embed="rId5">
-            <a:extLst>
-              <a:ext uri="{28A0092B-C50C-407E-A947-70E740481C1C}">
-                <a14:useLocalDpi xmlns:a14="http://schemas.microsoft.com/office/drawing/2010/main" val="0"/>
-              </a:ext>
-            </a:extLst>
-          </a:blip>
-          <a:srcRect/>
-          <a:stretch>
-            <a:fillRect/>
-          </a:stretch>
-        </p:blipFill>
-        <p:spPr bwMode="auto">
-          <a:xfrm>
-            <a:off x="11575799" y="11370212"/>
-            <a:ext cx="10885190" cy="5192958"/>
-          </a:xfrm>
-          <a:prstGeom prst="rect">
-            <a:avLst/>
-          </a:prstGeom>
-          <a:noFill/>
-          <a:extLst>
-            <a:ext uri="{909E8E84-426E-40DD-AFC4-6F175D3DCCD1}">
-              <a14:hiddenFill xmlns:a14="http://schemas.microsoft.com/office/drawing/2010/main">
+              <a14:hiddenFill xmlns:a14="http://schemas.microsoft.com/office/drawing/2010/main" xmlns="">
                 <a:solidFill>
                   <a:srgbClr val="FFFFFF"/>
                 </a:solidFill>
@@ -14131,25 +14023,180 @@
           <p:nvPr/>
         </p:nvPicPr>
         <p:blipFill>
-          <a:blip r:embed="rId6"/>
+          <a:blip r:embed="rId6" cstate="print"/>
           <a:stretch>
             <a:fillRect/>
           </a:stretch>
         </p:blipFill>
         <p:spPr>
           <a:xfrm>
-            <a:off x="28255886" y="4954852"/>
-            <a:ext cx="3789215" cy="4036087"/>
+            <a:off x="28119878" y="4798704"/>
+            <a:ext cx="4030295" cy="4292873"/>
           </a:xfrm>
           <a:prstGeom prst="rect">
             <a:avLst/>
           </a:prstGeom>
         </p:spPr>
       </p:pic>
+      <p:sp>
+        <p:nvSpPr>
+          <p:cNvPr id="68" name="Text Placeholder 185"/>
+          <p:cNvSpPr>
+            <a:spLocks noGrp="1"/>
+          </p:cNvSpPr>
+          <p:nvPr>
+            <p:ph type="body" sz="quarter" idx="21"/>
+          </p:nvPr>
+        </p:nvSpPr>
+        <p:spPr>
+          <a:xfrm>
+            <a:off x="19477355" y="11651201"/>
+            <a:ext cx="4749749" cy="5623462"/>
+          </a:xfrm>
+        </p:spPr>
+        <p:txBody>
+          <a:bodyPr/>
+          <a:lstStyle/>
+          <a:p>
+            <a:r>
+              <a:rPr lang="el-GR" sz="2000" dirty="0" smtClean="0">
+                <a:latin typeface="Cambria Math"/>
+                <a:ea typeface="Cambria Math"/>
+              </a:rPr>
+              <a:t>α</a:t>
+            </a:r>
+            <a:r>
+              <a:rPr lang="en-US" sz="2000" dirty="0" smtClean="0">
+                <a:latin typeface="Cambria Math"/>
+                <a:ea typeface="Cambria Math"/>
+              </a:rPr>
+              <a:t>-</a:t>
+            </a:r>
+            <a:r>
+              <a:rPr lang="el-GR" sz="2000" dirty="0" smtClean="0">
+                <a:latin typeface="Cambria Math"/>
+                <a:ea typeface="Cambria Math"/>
+              </a:rPr>
+              <a:t>β</a:t>
+            </a:r>
+            <a:r>
+              <a:rPr lang="en-US" sz="2000" dirty="0" smtClean="0">
+                <a:latin typeface="Cambria Math"/>
+                <a:ea typeface="Cambria Math"/>
+              </a:rPr>
+              <a:t> pruning </a:t>
+            </a:r>
+            <a:r>
+              <a:rPr lang="en-US" sz="2000" dirty="0" smtClean="0">
+                <a:latin typeface="Cambria Math"/>
+                <a:ea typeface="Cambria Math"/>
+              </a:rPr>
+              <a:t>is the standard optimization technique for </a:t>
+            </a:r>
+            <a:r>
+              <a:rPr lang="en-US" sz="2000" dirty="0" err="1" smtClean="0">
+                <a:latin typeface="Cambria Math"/>
+                <a:ea typeface="Cambria Math"/>
+              </a:rPr>
+              <a:t>minimax</a:t>
+            </a:r>
+            <a:r>
+              <a:rPr lang="en-US" sz="2000" dirty="0" smtClean="0">
+                <a:latin typeface="Cambria Math"/>
+                <a:ea typeface="Cambria Math"/>
+              </a:rPr>
+              <a:t> game state trees.  The algorithm updates the </a:t>
+            </a:r>
+            <a:r>
+              <a:rPr lang="el-GR" sz="2000" dirty="0" smtClean="0">
+                <a:latin typeface="Cambria Math"/>
+                <a:ea typeface="Cambria Math"/>
+              </a:rPr>
+              <a:t>α</a:t>
+            </a:r>
+            <a:r>
+              <a:rPr lang="en-US" sz="2000" dirty="0" smtClean="0">
+                <a:latin typeface="Cambria Math"/>
+                <a:ea typeface="Cambria Math"/>
+              </a:rPr>
+              <a:t>-</a:t>
+            </a:r>
+            <a:r>
+              <a:rPr lang="el-GR" sz="2000" dirty="0" smtClean="0">
+                <a:latin typeface="Cambria Math"/>
+                <a:ea typeface="Cambria Math"/>
+              </a:rPr>
+              <a:t>β</a:t>
+            </a:r>
+            <a:r>
+              <a:rPr lang="en-US" sz="2000" dirty="0" smtClean="0">
+                <a:latin typeface="Cambria Math"/>
+                <a:ea typeface="Cambria Math"/>
+              </a:rPr>
+              <a:t> </a:t>
+            </a:r>
+            <a:r>
+              <a:rPr lang="en-US" sz="2000" dirty="0" smtClean="0">
+                <a:latin typeface="Cambria Math"/>
+                <a:ea typeface="Cambria Math"/>
+              </a:rPr>
+              <a:t>values which represent the minimum of the maximizing player and the maximum of the minimizing player.  All branches that are outside of these assured bounds need not be evaluated.</a:t>
+            </a:r>
+          </a:p>
+          <a:p>
+            <a:r>
+              <a:rPr lang="en-US" sz="2000" dirty="0" smtClean="0">
+                <a:latin typeface="Cambria Math"/>
+                <a:ea typeface="Cambria Math"/>
+              </a:rPr>
+              <a:t>Tree ordering, or evaluating the best moves first, will better prune the tree. – in other words the branches with the greatest pruning power will be evaluated first.  It has been shown that with optimal ordering, the same computation power will allow for twice the number of ply searched .</a:t>
+            </a:r>
+            <a:endParaRPr lang="en-US" sz="2000" dirty="0" smtClean="0">
+              <a:latin typeface="Constantia" pitchFamily="18" charset="0"/>
+            </a:endParaRPr>
+          </a:p>
+        </p:txBody>
+      </p:sp>
+      <p:sp>
+        <p:nvSpPr>
+          <p:cNvPr id="70" name="Rectangle 69"/>
+          <p:cNvSpPr/>
+          <p:nvPr/>
+        </p:nvSpPr>
+        <p:spPr bwMode="auto">
+          <a:xfrm>
+            <a:off x="1291389" y="21412200"/>
+            <a:ext cx="1660358" cy="441158"/>
+          </a:xfrm>
+          <a:prstGeom prst="rect">
+            <a:avLst/>
+          </a:prstGeom>
+          <a:solidFill>
+            <a:srgbClr val="233B5F">
+              <a:alpha val="98824"/>
+            </a:srgbClr>
+          </a:solidFill>
+          <a:ln w="9525">
+            <a:noFill/>
+            <a:miter lim="800000"/>
+            <a:headEnd/>
+            <a:tailEnd/>
+          </a:ln>
+          <a:effectLst/>
+        </p:spPr>
+        <p:txBody>
+          <a:bodyPr wrap="none" lIns="65304" tIns="32651" rIns="65304" bIns="32651" rtlCol="0" anchor="ctr"/>
+          <a:lstStyle/>
+          <a:p>
+            <a:pPr algn="ctr"/>
+            <a:endParaRPr lang="en-US" dirty="0"/>
+          </a:p>
+        </p:txBody>
+      </p:sp>
     </p:spTree>
     <p:extLst>
       <p:ext uri="{BB962C8B-B14F-4D97-AF65-F5344CB8AC3E}">
-        <p14:creationId xmlns:p14="http://schemas.microsoft.com/office/powerpoint/2010/main" val="2212419635"/>
+        <p14:creationId xmlns:p14="http://schemas.microsoft.com/office/powerpoint/2010/main" xmlns="" val="2212419635"/>
       </p:ext>
     </p:extLst>
   </p:cSld>

</xml_diff>